<commit_message>
Removed some errors on powerpoint
</commit_message>
<xml_diff>
--- a/Clean Code.pptx
+++ b/Clean Code.pptx
@@ -261,7 +261,7 @@
               <a:pPr>
                 <a:defRPr/>
               </a:pPr>
-              <a:t>9/12/2011</a:t>
+              <a:t>9/13/2011</a:t>
             </a:fld>
             <a:endParaRPr lang="en-US"/>
           </a:p>
@@ -439,7 +439,7 @@
               <a:pPr>
                 <a:defRPr/>
               </a:pPr>
-              <a:t>9/12/2011</a:t>
+              <a:t>9/13/2011</a:t>
             </a:fld>
             <a:endParaRPr lang="en-US"/>
           </a:p>
@@ -1600,38 +1600,6 @@
           </a:p>
         </p:txBody>
       </p:sp>
-      <p:pic>
-        <p:nvPicPr>
-          <p:cNvPr id="1031" name="Picture 9" descr="MAT logo color vertical.emf"/>
-          <p:cNvPicPr>
-            <a:picLocks noChangeAspect="1"/>
-          </p:cNvPicPr>
-          <p:nvPr userDrawn="1"/>
-        </p:nvPicPr>
-        <p:blipFill>
-          <a:blip r:embed="rId4"/>
-          <a:srcRect/>
-          <a:stretch>
-            <a:fillRect/>
-          </a:stretch>
-        </p:blipFill>
-        <p:spPr bwMode="auto">
-          <a:xfrm>
-            <a:off x="7924800" y="123825"/>
-            <a:ext cx="1066800" cy="496888"/>
-          </a:xfrm>
-          <a:prstGeom prst="rect">
-            <a:avLst/>
-          </a:prstGeom>
-          <a:noFill/>
-          <a:ln w="9525">
-            <a:noFill/>
-            <a:miter lim="800000"/>
-            <a:headEnd/>
-            <a:tailEnd/>
-          </a:ln>
-        </p:spPr>
-      </p:pic>
     </p:spTree>
   </p:cSld>
   <p:clrMap bg1="lt1" tx1="dk1" bg2="lt2" tx2="dk2" accent1="accent1" accent2="accent2" accent3="accent3" accent4="accent4" accent5="accent5" accent6="accent6" hlink="hlink" folHlink="folHlink"/>
@@ -2233,57 +2201,6 @@
       </p:sp>
       <p:sp>
         <p:nvSpPr>
-          <p:cNvPr id="2054" name="TextBox 16"/>
-          <p:cNvSpPr txBox="1">
-            <a:spLocks noChangeArrowheads="1"/>
-          </p:cNvSpPr>
-          <p:nvPr/>
-        </p:nvSpPr>
-        <p:spPr bwMode="auto">
-          <a:xfrm>
-            <a:off x="2819400" y="6581775"/>
-            <a:ext cx="3429000" cy="276225"/>
-          </a:xfrm>
-          <a:prstGeom prst="rect">
-            <a:avLst/>
-          </a:prstGeom>
-          <a:solidFill>
-            <a:srgbClr val="E31937"/>
-          </a:solidFill>
-          <a:ln w="9525">
-            <a:noFill/>
-            <a:miter lim="800000"/>
-            <a:headEnd/>
-            <a:tailEnd/>
-          </a:ln>
-        </p:spPr>
-        <p:txBody>
-          <a:bodyPr>
-            <a:spAutoFit/>
-          </a:bodyPr>
-          <a:lstStyle/>
-          <a:p>
-            <a:pPr algn="ctr"/>
-            <a:r>
-              <a:rPr lang="en-US" sz="1200" dirty="0" smtClean="0">
-                <a:solidFill>
-                  <a:schemeClr val="bg1"/>
-                </a:solidFill>
-                <a:latin typeface="Calibri" pitchFamily="34" charset="0"/>
-              </a:rPr>
-              <a:t>Copyright 2008 McLane Advanced Technologies, LLC</a:t>
-            </a:r>
-            <a:endParaRPr lang="en-US" sz="1200" dirty="0">
-              <a:solidFill>
-                <a:schemeClr val="bg1"/>
-              </a:solidFill>
-              <a:latin typeface="Calibri" pitchFamily="34" charset="0"/>
-            </a:endParaRPr>
-          </a:p>
-        </p:txBody>
-      </p:sp>
-      <p:sp>
-        <p:nvSpPr>
           <p:cNvPr id="14" name="TextBox 13"/>
           <p:cNvSpPr txBox="1"/>
           <p:nvPr/>
@@ -2377,38 +2294,6 @@
           </a:p>
         </p:txBody>
       </p:sp>
-      <p:pic>
-        <p:nvPicPr>
-          <p:cNvPr id="2057" name="Picture 9" descr="MAT logo vertical_red.emf"/>
-          <p:cNvPicPr>
-            <a:picLocks noChangeAspect="1"/>
-          </p:cNvPicPr>
-          <p:nvPr/>
-        </p:nvPicPr>
-        <p:blipFill>
-          <a:blip r:embed="rId3"/>
-          <a:srcRect/>
-          <a:stretch>
-            <a:fillRect/>
-          </a:stretch>
-        </p:blipFill>
-        <p:spPr bwMode="auto">
-          <a:xfrm>
-            <a:off x="6248400" y="5181600"/>
-            <a:ext cx="2286000" cy="1119188"/>
-          </a:xfrm>
-          <a:prstGeom prst="rect">
-            <a:avLst/>
-          </a:prstGeom>
-          <a:noFill/>
-          <a:ln w="9525">
-            <a:noFill/>
-            <a:miter lim="800000"/>
-            <a:headEnd/>
-            <a:tailEnd/>
-          </a:ln>
-        </p:spPr>
-      </p:pic>
       <p:sp>
         <p:nvSpPr>
           <p:cNvPr id="10" name="TextBox 9"/>
@@ -2475,7 +2360,7 @@
           <p:nvPr/>
         </p:nvPicPr>
         <p:blipFill>
-          <a:blip r:embed="rId4"/>
+          <a:blip r:embed="rId3"/>
           <a:stretch>
             <a:fillRect/>
           </a:stretch>
@@ -2781,7 +2666,15 @@
             </a:pPr>
             <a:r>
               <a:rPr lang="en-US" sz="2000" dirty="0" smtClean="0"/>
-              <a:t>Create a method that calls   and protected method </a:t>
+              <a:t>Create a method that calls </a:t>
+            </a:r>
+            <a:r>
+              <a:rPr lang="en-US" sz="2000" dirty="0" smtClean="0"/>
+              <a:t>a protected </a:t>
+            </a:r>
+            <a:r>
+              <a:rPr lang="en-US" sz="2000" dirty="0" smtClean="0"/>
+              <a:t>method </a:t>
             </a:r>
           </a:p>
           <a:p>
@@ -2811,7 +2704,21 @@
                 <a:latin typeface="Courier New" pitchFamily="49" charset="0"/>
                 <a:cs typeface="Courier New" pitchFamily="49" charset="0"/>
               </a:rPr>
-              <a:t>(</a:t>
+              <a:t>(string </a:t>
+            </a:r>
+            <a:r>
+              <a:rPr lang="en-US" sz="1400" dirty="0" err="1" smtClean="0">
+                <a:latin typeface="Courier New" pitchFamily="49" charset="0"/>
+                <a:cs typeface="Courier New" pitchFamily="49" charset="0"/>
+              </a:rPr>
+              <a:t>productId</a:t>
+            </a:r>
+            <a:r>
+              <a:rPr lang="en-US" sz="1400" dirty="0" smtClean="0">
+                <a:latin typeface="Courier New" pitchFamily="49" charset="0"/>
+                <a:cs typeface="Courier New" pitchFamily="49" charset="0"/>
+              </a:rPr>
+              <a:t>, </a:t>
             </a:r>
             <a:r>
               <a:rPr lang="en-US" sz="1400" dirty="0" err="1" smtClean="0">
@@ -2827,6 +2734,10 @@
               </a:rPr>
               <a:t> qty)</a:t>
             </a:r>
+            <a:endParaRPr lang="en-US" sz="1400" dirty="0" smtClean="0">
+              <a:latin typeface="Courier New" pitchFamily="49" charset="0"/>
+              <a:cs typeface="Courier New" pitchFamily="49" charset="0"/>
+            </a:endParaRPr>
           </a:p>
           <a:p>
             <a:pPr marL="457200" indent="-457200">
@@ -4035,7 +3946,6 @@
               <a:rPr lang="en-US" dirty="0" smtClean="0"/>
               <a:t>Exercise Part 2 – Fix This Code</a:t>
             </a:r>
-            <a:endParaRPr lang="en-US" dirty="0" smtClean="0"/>
           </a:p>
         </p:txBody>
       </p:sp>
@@ -4084,10 +3994,6 @@
               </a:rPr>
               <a:t>    </a:t>
             </a:r>
-            <a:endParaRPr lang="en-US" sz="1100" dirty="0" smtClean="0">
-              <a:latin typeface="Courier New" pitchFamily="49" charset="0"/>
-              <a:cs typeface="Courier New" pitchFamily="49" charset="0"/>
-            </a:endParaRPr>
           </a:p>
           <a:p>
             <a:pPr marL="457200" indent="-457200">
@@ -4225,9 +4131,6 @@
               </a:rPr>
               <a:t>You discovered the function where the bug occurs and you discover that the function is shared by both logins.  </a:t>
             </a:r>
-            <a:endParaRPr lang="en-US" sz="2400" dirty="0" smtClean="0">
-              <a:latin typeface="+mn-lt"/>
-            </a:endParaRPr>
           </a:p>
         </p:txBody>
       </p:sp>
@@ -4294,7 +4197,6 @@
               <a:rPr lang="en-US" dirty="0" smtClean="0"/>
               <a:t>Exercise Part 2 – Fix This Code</a:t>
             </a:r>
-            <a:endParaRPr lang="en-US" dirty="0" smtClean="0"/>
           </a:p>
         </p:txBody>
       </p:sp>
@@ -4528,21 +4430,7 @@
                 <a:latin typeface="Courier New" pitchFamily="49" charset="0"/>
                 <a:cs typeface="Courier New" pitchFamily="49" charset="0"/>
               </a:rPr>
-              <a:t>  </a:t>
-            </a:r>
-            <a:r>
-              <a:rPr lang="en-US" sz="1400" dirty="0" smtClean="0">
-                <a:latin typeface="Courier New" pitchFamily="49" charset="0"/>
-                <a:cs typeface="Courier New" pitchFamily="49" charset="0"/>
-              </a:rPr>
-              <a:t>          </a:t>
-            </a:r>
-            <a:r>
-              <a:rPr lang="en-US" sz="1400" dirty="0" smtClean="0">
-                <a:latin typeface="Courier New" pitchFamily="49" charset="0"/>
-                <a:cs typeface="Courier New" pitchFamily="49" charset="0"/>
-              </a:rPr>
-              <a:t>if(</a:t>
+              <a:t>            if(</a:t>
             </a:r>
             <a:r>
               <a:rPr lang="en-US" sz="1400" dirty="0" err="1" smtClean="0">
@@ -4556,19 +4444,8 @@
                 <a:latin typeface="Courier New" pitchFamily="49" charset="0"/>
                 <a:cs typeface="Courier New" pitchFamily="49" charset="0"/>
               </a:rPr>
-              <a:t> != null</a:t>
-            </a:r>
-            <a:r>
-              <a:rPr lang="en-US" sz="1400" dirty="0" smtClean="0">
-                <a:latin typeface="Courier New" pitchFamily="49" charset="0"/>
-                <a:cs typeface="Courier New" pitchFamily="49" charset="0"/>
-              </a:rPr>
-              <a:t>){</a:t>
-            </a:r>
-            <a:endParaRPr lang="en-US" sz="1400" dirty="0" smtClean="0">
-              <a:latin typeface="Courier New" pitchFamily="49" charset="0"/>
-              <a:cs typeface="Courier New" pitchFamily="49" charset="0"/>
-            </a:endParaRPr>
+              <a:t> != null){</a:t>
+            </a:r>
           </a:p>
           <a:p>
             <a:r>
@@ -4620,6 +4497,45 @@
               </a:rPr>
               <a:t>)){</a:t>
             </a:r>
+          </a:p>
+          <a:p>
+            <a:r>
+              <a:rPr lang="en-US" sz="1400" dirty="0" smtClean="0">
+                <a:latin typeface="Courier New" pitchFamily="49" charset="0"/>
+                <a:cs typeface="Courier New" pitchFamily="49" charset="0"/>
+              </a:rPr>
+              <a:t>                    </a:t>
+            </a:r>
+            <a:r>
+              <a:rPr lang="en-US" sz="1400" dirty="0" smtClean="0">
+                <a:latin typeface="Courier New" pitchFamily="49" charset="0"/>
+                <a:cs typeface="Courier New" pitchFamily="49" charset="0"/>
+              </a:rPr>
+              <a:t> </a:t>
+            </a:r>
+          </a:p>
+          <a:p>
+            <a:r>
+              <a:rPr lang="en-US" sz="1400" dirty="0" smtClean="0">
+                <a:latin typeface="Courier New" pitchFamily="49" charset="0"/>
+                <a:cs typeface="Courier New" pitchFamily="49" charset="0"/>
+              </a:rPr>
+              <a:t> </a:t>
+            </a:r>
+            <a:r>
+              <a:rPr lang="en-US" sz="1400" dirty="0" smtClean="0">
+                <a:latin typeface="Courier New" pitchFamily="49" charset="0"/>
+                <a:cs typeface="Courier New" pitchFamily="49" charset="0"/>
+              </a:rPr>
+              <a:t>               </a:t>
+            </a:r>
+            <a:r>
+              <a:rPr lang="en-US" sz="1400" dirty="0" smtClean="0">
+                <a:latin typeface="Courier New" pitchFamily="49" charset="0"/>
+                <a:cs typeface="Courier New" pitchFamily="49" charset="0"/>
+              </a:rPr>
+              <a:t>}</a:t>
+            </a:r>
             <a:endParaRPr lang="en-US" sz="1400" dirty="0" smtClean="0">
               <a:latin typeface="Courier New" pitchFamily="49" charset="0"/>
               <a:cs typeface="Courier New" pitchFamily="49" charset="0"/>
@@ -4631,7 +4547,7 @@
                 <a:latin typeface="Courier New" pitchFamily="49" charset="0"/>
                 <a:cs typeface="Courier New" pitchFamily="49" charset="0"/>
               </a:rPr>
-              <a:t>                    result = true;</a:t>
+              <a:t>                else{</a:t>
             </a:r>
           </a:p>
           <a:p>
@@ -4640,7 +4556,57 @@
                 <a:latin typeface="Courier New" pitchFamily="49" charset="0"/>
                 <a:cs typeface="Courier New" pitchFamily="49" charset="0"/>
               </a:rPr>
-              <a:t>                }</a:t>
+              <a:t>                     </a:t>
+            </a:r>
+            <a:r>
+              <a:rPr lang="en-US" sz="1400" dirty="0" err="1" smtClean="0">
+                <a:latin typeface="Courier New" pitchFamily="49" charset="0"/>
+                <a:cs typeface="Courier New" pitchFamily="49" charset="0"/>
+              </a:rPr>
+              <a:t>msg</a:t>
+            </a:r>
+            <a:r>
+              <a:rPr lang="en-US" sz="1400" dirty="0" smtClean="0">
+                <a:latin typeface="Courier New" pitchFamily="49" charset="0"/>
+                <a:cs typeface="Courier New" pitchFamily="49" charset="0"/>
+              </a:rPr>
+              <a:t> = "Invalid user or password";                                    </a:t>
+            </a:r>
+          </a:p>
+          <a:p>
+            <a:r>
+              <a:rPr lang="en-US" sz="1400" dirty="0" smtClean="0">
+                <a:latin typeface="Courier New" pitchFamily="49" charset="0"/>
+                <a:cs typeface="Courier New" pitchFamily="49" charset="0"/>
+              </a:rPr>
+              <a:t>                     result = false;</a:t>
+            </a:r>
+          </a:p>
+          <a:p>
+            <a:r>
+              <a:rPr lang="en-US" sz="1400" dirty="0" smtClean="0">
+                <a:latin typeface="Courier New" pitchFamily="49" charset="0"/>
+                <a:cs typeface="Courier New" pitchFamily="49" charset="0"/>
+              </a:rPr>
+              <a:t>                } </a:t>
+            </a:r>
+          </a:p>
+          <a:p>
+            <a:r>
+              <a:rPr lang="en-US" sz="1400" dirty="0" smtClean="0">
+                <a:latin typeface="Courier New" pitchFamily="49" charset="0"/>
+                <a:cs typeface="Courier New" pitchFamily="49" charset="0"/>
+              </a:rPr>
+              <a:t>            }</a:t>
+            </a:r>
+          </a:p>
+          <a:p>
+            <a:r>
+              <a:rPr lang="en-US" sz="1400" dirty="0" smtClean="0">
+                <a:latin typeface="Courier New" pitchFamily="49" charset="0"/>
+                <a:cs typeface="Courier New" pitchFamily="49" charset="0"/>
+              </a:rPr>
+              <a:t>            else{</a:t>
             </a:r>
           </a:p>
           <a:p>
@@ -4652,26 +4618,6 @@
               <a:t>                </a:t>
             </a:r>
             <a:r>
-              <a:rPr lang="en-US" sz="1400" dirty="0" smtClean="0">
-                <a:latin typeface="Courier New" pitchFamily="49" charset="0"/>
-                <a:cs typeface="Courier New" pitchFamily="49" charset="0"/>
-              </a:rPr>
-              <a:t>else{</a:t>
-            </a:r>
-            <a:endParaRPr lang="en-US" sz="1400" dirty="0" smtClean="0">
-              <a:latin typeface="Courier New" pitchFamily="49" charset="0"/>
-              <a:cs typeface="Courier New" pitchFamily="49" charset="0"/>
-            </a:endParaRPr>
-          </a:p>
-          <a:p>
-            <a:r>
-              <a:rPr lang="en-US" sz="1400" dirty="0" smtClean="0">
-                <a:latin typeface="Courier New" pitchFamily="49" charset="0"/>
-                <a:cs typeface="Courier New" pitchFamily="49" charset="0"/>
-              </a:rPr>
-              <a:t>                     </a:t>
-            </a:r>
-            <a:r>
               <a:rPr lang="en-US" sz="1400" dirty="0" err="1" smtClean="0">
                 <a:latin typeface="Courier New" pitchFamily="49" charset="0"/>
                 <a:cs typeface="Courier New" pitchFamily="49" charset="0"/>
@@ -4683,7 +4629,7 @@
                 <a:latin typeface="Courier New" pitchFamily="49" charset="0"/>
                 <a:cs typeface="Courier New" pitchFamily="49" charset="0"/>
               </a:rPr>
-              <a:t> = "Invalid user or password";                                    </a:t>
+              <a:t> = "Invalid user or password";</a:t>
             </a:r>
           </a:p>
           <a:p>
@@ -4692,7 +4638,7 @@
                 <a:latin typeface="Courier New" pitchFamily="49" charset="0"/>
                 <a:cs typeface="Courier New" pitchFamily="49" charset="0"/>
               </a:rPr>
-              <a:t>                     result = false;</a:t>
+              <a:t>                result = false;    </a:t>
             </a:r>
           </a:p>
           <a:p>
@@ -4701,7 +4647,7 @@
                 <a:latin typeface="Courier New" pitchFamily="49" charset="0"/>
                 <a:cs typeface="Courier New" pitchFamily="49" charset="0"/>
               </a:rPr>
-              <a:t>                } </a:t>
+              <a:t>            }</a:t>
             </a:r>
           </a:p>
           <a:p>
@@ -4710,43 +4656,28 @@
                 <a:latin typeface="Courier New" pitchFamily="49" charset="0"/>
                 <a:cs typeface="Courier New" pitchFamily="49" charset="0"/>
               </a:rPr>
-              <a:t>            </a:t>
+              <a:t>            if</a:t>
             </a:r>
             <a:r>
               <a:rPr lang="en-US" sz="1400" dirty="0" smtClean="0">
                 <a:latin typeface="Courier New" pitchFamily="49" charset="0"/>
                 <a:cs typeface="Courier New" pitchFamily="49" charset="0"/>
               </a:rPr>
-              <a:t>}</a:t>
-            </a:r>
-          </a:p>
-          <a:p>
+              <a:t>(!</a:t>
+            </a:r>
+            <a:r>
+              <a:rPr lang="en-US" sz="1400" dirty="0" err="1" smtClean="0">
+                <a:latin typeface="Courier New" pitchFamily="49" charset="0"/>
+                <a:cs typeface="Courier New" pitchFamily="49" charset="0"/>
+              </a:rPr>
+              <a:t>string.IsNullOrEmpty</a:t>
+            </a:r>
             <a:r>
               <a:rPr lang="en-US" sz="1400" dirty="0" smtClean="0">
                 <a:latin typeface="Courier New" pitchFamily="49" charset="0"/>
                 <a:cs typeface="Courier New" pitchFamily="49" charset="0"/>
               </a:rPr>
-              <a:t> </a:t>
-            </a:r>
-            <a:r>
-              <a:rPr lang="en-US" sz="1400" dirty="0" smtClean="0">
-                <a:latin typeface="Courier New" pitchFamily="49" charset="0"/>
-                <a:cs typeface="Courier New" pitchFamily="49" charset="0"/>
-              </a:rPr>
-              <a:t>           else{</a:t>
-            </a:r>
-            <a:endParaRPr lang="en-US" sz="1400" dirty="0" smtClean="0">
-              <a:latin typeface="Courier New" pitchFamily="49" charset="0"/>
-              <a:cs typeface="Courier New" pitchFamily="49" charset="0"/>
-            </a:endParaRPr>
-          </a:p>
-          <a:p>
-            <a:r>
-              <a:rPr lang="en-US" sz="1400" dirty="0" smtClean="0">
-                <a:latin typeface="Courier New" pitchFamily="49" charset="0"/>
-                <a:cs typeface="Courier New" pitchFamily="49" charset="0"/>
-              </a:rPr>
-              <a:t>                </a:t>
+              <a:t>(</a:t>
             </a:r>
             <a:r>
               <a:rPr lang="en-US" sz="1400" dirty="0" err="1" smtClean="0">
@@ -4760,8 +4691,12 @@
                 <a:latin typeface="Courier New" pitchFamily="49" charset="0"/>
                 <a:cs typeface="Courier New" pitchFamily="49" charset="0"/>
               </a:rPr>
-              <a:t> = "Invalid user or password";</a:t>
-            </a:r>
+              <a:t>))</a:t>
+            </a:r>
+            <a:endParaRPr lang="en-US" sz="1400" dirty="0" smtClean="0">
+              <a:latin typeface="Courier New" pitchFamily="49" charset="0"/>
+              <a:cs typeface="Courier New" pitchFamily="49" charset="0"/>
+            </a:endParaRPr>
           </a:p>
           <a:p>
             <a:r>
@@ -4769,39 +4704,14 @@
                 <a:latin typeface="Courier New" pitchFamily="49" charset="0"/>
                 <a:cs typeface="Courier New" pitchFamily="49" charset="0"/>
               </a:rPr>
-              <a:t>                result = false;    </a:t>
-            </a:r>
-          </a:p>
-          <a:p>
-            <a:r>
-              <a:rPr lang="en-US" sz="1400" dirty="0" smtClean="0">
-                <a:latin typeface="Courier New" pitchFamily="49" charset="0"/>
-                <a:cs typeface="Courier New" pitchFamily="49" charset="0"/>
-              </a:rPr>
-              <a:t>            }</a:t>
-            </a:r>
-          </a:p>
-          <a:p>
-            <a:r>
-              <a:rPr lang="en-US" sz="1400" dirty="0" smtClean="0">
-                <a:latin typeface="Courier New" pitchFamily="49" charset="0"/>
-                <a:cs typeface="Courier New" pitchFamily="49" charset="0"/>
-              </a:rPr>
-              <a:t>            </a:t>
-            </a:r>
-            <a:r>
-              <a:rPr lang="en-US" sz="1400" dirty="0" smtClean="0">
-                <a:latin typeface="Courier New" pitchFamily="49" charset="0"/>
-                <a:cs typeface="Courier New" pitchFamily="49" charset="0"/>
-              </a:rPr>
-              <a:t>if(</a:t>
+              <a:t>                 </a:t>
             </a:r>
             <a:r>
               <a:rPr lang="en-US" sz="1400" dirty="0" err="1" smtClean="0">
                 <a:latin typeface="Courier New" pitchFamily="49" charset="0"/>
                 <a:cs typeface="Courier New" pitchFamily="49" charset="0"/>
               </a:rPr>
-              <a:t>string.IsNullOrEmpty</a:t>
+              <a:t>MessageBox.Show</a:t>
             </a:r>
             <a:r>
               <a:rPr lang="en-US" sz="1400" dirty="0" smtClean="0">
@@ -4822,7 +4732,7 @@
                 <a:latin typeface="Courier New" pitchFamily="49" charset="0"/>
                 <a:cs typeface="Courier New" pitchFamily="49" charset="0"/>
               </a:rPr>
-              <a:t>)</a:t>
+              <a:t>);            </a:t>
             </a:r>
           </a:p>
           <a:p>
@@ -4831,60 +4741,8 @@
                 <a:latin typeface="Courier New" pitchFamily="49" charset="0"/>
                 <a:cs typeface="Courier New" pitchFamily="49" charset="0"/>
               </a:rPr>
-              <a:t>                 </a:t>
-            </a:r>
-            <a:r>
-              <a:rPr lang="en-US" sz="1400" dirty="0" err="1" smtClean="0">
-                <a:latin typeface="Courier New" pitchFamily="49" charset="0"/>
-                <a:cs typeface="Courier New" pitchFamily="49" charset="0"/>
-              </a:rPr>
-              <a:t>MessageBox.Show</a:t>
-            </a:r>
-            <a:r>
-              <a:rPr lang="en-US" sz="1400" dirty="0" smtClean="0">
-                <a:latin typeface="Courier New" pitchFamily="49" charset="0"/>
-                <a:cs typeface="Courier New" pitchFamily="49" charset="0"/>
-              </a:rPr>
-              <a:t>(</a:t>
-            </a:r>
-            <a:r>
-              <a:rPr lang="en-US" sz="1400" dirty="0" err="1" smtClean="0">
-                <a:latin typeface="Courier New" pitchFamily="49" charset="0"/>
-                <a:cs typeface="Courier New" pitchFamily="49" charset="0"/>
-              </a:rPr>
-              <a:t>msg</a:t>
-            </a:r>
-            <a:r>
-              <a:rPr lang="en-US" sz="1400" dirty="0" smtClean="0">
-                <a:latin typeface="Courier New" pitchFamily="49" charset="0"/>
-                <a:cs typeface="Courier New" pitchFamily="49" charset="0"/>
-              </a:rPr>
-              <a:t>);            </a:t>
-            </a:r>
-            <a:endParaRPr lang="en-US" sz="1400" dirty="0" smtClean="0">
-              <a:latin typeface="Courier New" pitchFamily="49" charset="0"/>
-              <a:cs typeface="Courier New" pitchFamily="49" charset="0"/>
-            </a:endParaRPr>
-          </a:p>
-          <a:p>
-            <a:r>
-              <a:rPr lang="en-US" sz="1400" dirty="0" smtClean="0">
-                <a:latin typeface="Courier New" pitchFamily="49" charset="0"/>
-                <a:cs typeface="Courier New" pitchFamily="49" charset="0"/>
-              </a:rPr>
-              <a:t>            return </a:t>
-            </a:r>
-            <a:r>
-              <a:rPr lang="en-US" sz="1400" dirty="0" smtClean="0">
-                <a:latin typeface="Courier New" pitchFamily="49" charset="0"/>
-                <a:cs typeface="Courier New" pitchFamily="49" charset="0"/>
-              </a:rPr>
-              <a:t>false;</a:t>
-            </a:r>
-            <a:endParaRPr lang="en-US" sz="1400" dirty="0" smtClean="0">
-              <a:latin typeface="Courier New" pitchFamily="49" charset="0"/>
-              <a:cs typeface="Courier New" pitchFamily="49" charset="0"/>
-            </a:endParaRPr>
+              <a:t>            return false;</a:t>
+            </a:r>
           </a:p>
           <a:p>
             <a:r>
@@ -4903,10 +4761,6 @@
               </a:rPr>
               <a:t>    </a:t>
             </a:r>
-            <a:endParaRPr lang="en-US" sz="1100" dirty="0" smtClean="0">
-              <a:latin typeface="Courier New" pitchFamily="49" charset="0"/>
-              <a:cs typeface="Courier New" pitchFamily="49" charset="0"/>
-            </a:endParaRPr>
           </a:p>
           <a:p>
             <a:pPr marL="457200" indent="-457200">
@@ -6815,16 +6669,13 @@
             <a:pPr marL="457200" indent="-457200">
               <a:buNone/>
             </a:pPr>
-            <a:r>
-              <a:rPr lang="en-US" sz="2000" b="1" dirty="0" smtClean="0">
-                <a:solidFill>
-                  <a:srgbClr val="00B050"/>
-                </a:solidFill>
-                <a:latin typeface="Courier New" pitchFamily="49" charset="0"/>
-                <a:cs typeface="Courier New" pitchFamily="49" charset="0"/>
-              </a:rPr>
-              <a:t>1. </a:t>
-            </a:r>
+            <a:endParaRPr lang="en-US" sz="2000" b="1" dirty="0" smtClean="0">
+              <a:solidFill>
+                <a:srgbClr val="00B050"/>
+              </a:solidFill>
+              <a:latin typeface="Courier New" pitchFamily="49" charset="0"/>
+              <a:cs typeface="Courier New" pitchFamily="49" charset="0"/>
+            </a:endParaRPr>
           </a:p>
           <a:p>
             <a:pPr marL="457200" indent="-457200">
@@ -6877,7 +6728,21 @@
                 <a:latin typeface="Courier New" pitchFamily="49" charset="0"/>
                 <a:cs typeface="Courier New" pitchFamily="49" charset="0"/>
               </a:rPr>
-              <a:t> = = DISCOUNT_ITEM &amp;&amp; </a:t>
+              <a:t> </a:t>
+            </a:r>
+            <a:r>
+              <a:rPr lang="en-US" sz="2000" b="1" dirty="0" smtClean="0">
+                <a:latin typeface="Courier New" pitchFamily="49" charset="0"/>
+                <a:cs typeface="Courier New" pitchFamily="49" charset="0"/>
+              </a:rPr>
+              <a:t>== </a:t>
+            </a:r>
+            <a:r>
+              <a:rPr lang="en-US" sz="2000" b="1" dirty="0" smtClean="0">
+                <a:latin typeface="Courier New" pitchFamily="49" charset="0"/>
+                <a:cs typeface="Courier New" pitchFamily="49" charset="0"/>
+              </a:rPr>
+              <a:t>DISCOUNT_ITEM &amp;&amp; </a:t>
             </a:r>
           </a:p>
           <a:p>
@@ -6914,24 +6779,6 @@
               <a:latin typeface="Courier New" pitchFamily="49" charset="0"/>
               <a:cs typeface="Courier New" pitchFamily="49" charset="0"/>
             </a:endParaRPr>
-          </a:p>
-          <a:p>
-            <a:pPr marL="457200" indent="-457200">
-              <a:buNone/>
-            </a:pPr>
-            <a:r>
-              <a:rPr lang="en-US" sz="2000" b="1" dirty="0" smtClean="0">
-                <a:solidFill>
-                  <a:schemeClr val="tx2">
-                    <a:lumMod val="60000"/>
-                    <a:lumOff val="40000"/>
-                  </a:schemeClr>
-                </a:solidFill>
-                <a:latin typeface="Courier New" pitchFamily="49" charset="0"/>
-                <a:cs typeface="Courier New" pitchFamily="49" charset="0"/>
-              </a:rPr>
-              <a:t>2. </a:t>
-            </a:r>
           </a:p>
           <a:p>
             <a:pPr marL="457200" indent="-457200">
@@ -7550,33 +7397,15 @@
                                   </p:childTnLst>
                                 </p:cTn>
                               </p:par>
-                            </p:childTnLst>
-                          </p:cTn>
-                        </p:par>
-                      </p:childTnLst>
-                    </p:cTn>
-                  </p:par>
-                  <p:par>
-                    <p:cTn id="33" fill="hold">
-                      <p:stCondLst>
-                        <p:cond delay="indefinite"/>
-                      </p:stCondLst>
-                      <p:childTnLst>
-                        <p:par>
-                          <p:cTn id="34" fill="hold">
-                            <p:stCondLst>
-                              <p:cond delay="0"/>
-                            </p:stCondLst>
-                            <p:childTnLst>
                               <p:par>
-                                <p:cTn id="35" presetID="2" presetClass="entr" presetSubtype="4" fill="hold" nodeType="clickEffect">
+                                <p:cTn id="33" presetID="2" presetClass="entr" presetSubtype="4" fill="hold" nodeType="withEffect">
                                   <p:stCondLst>
                                     <p:cond delay="0"/>
                                   </p:stCondLst>
                                   <p:childTnLst>
                                     <p:set>
                                       <p:cBhvr>
-                                        <p:cTn id="36" dur="1" fill="hold">
+                                        <p:cTn id="34" dur="1" fill="hold">
                                           <p:stCondLst>
                                             <p:cond delay="0"/>
                                           </p:stCondLst>
@@ -7584,7 +7413,7 @@
                                         <p:tgtEl>
                                           <p:spTgt spid="3075">
                                             <p:txEl>
-                                              <p:pRg st="6" end="6"/>
+                                              <p:pRg st="7" end="7"/>
                                             </p:txEl>
                                           </p:spTgt>
                                         </p:tgtEl>
@@ -7598,11 +7427,11 @@
                                     </p:set>
                                     <p:anim calcmode="lin" valueType="num">
                                       <p:cBhvr additive="base">
-                                        <p:cTn id="37" dur="500" fill="hold"/>
-                                        <p:tgtEl>
-                                          <p:spTgt spid="3075">
-                                            <p:txEl>
-                                              <p:pRg st="6" end="6"/>
+                                        <p:cTn id="35" dur="500" fill="hold"/>
+                                        <p:tgtEl>
+                                          <p:spTgt spid="3075">
+                                            <p:txEl>
+                                              <p:pRg st="7" end="7"/>
                                             </p:txEl>
                                           </p:spTgt>
                                         </p:tgtEl>
@@ -7625,11 +7454,11 @@
                                     </p:anim>
                                     <p:anim calcmode="lin" valueType="num">
                                       <p:cBhvr additive="base">
-                                        <p:cTn id="38" dur="500" fill="hold"/>
-                                        <p:tgtEl>
-                                          <p:spTgt spid="3075">
-                                            <p:txEl>
-                                              <p:pRg st="6" end="6"/>
+                                        <p:cTn id="36" dur="500" fill="hold"/>
+                                        <p:tgtEl>
+                                          <p:spTgt spid="3075">
+                                            <p:txEl>
+                                              <p:pRg st="7" end="7"/>
                                             </p:txEl>
                                           </p:spTgt>
                                         </p:tgtEl>
@@ -7654,14 +7483,14 @@
                                 </p:cTn>
                               </p:par>
                               <p:par>
-                                <p:cTn id="39" presetID="2" presetClass="entr" presetSubtype="4" fill="hold" nodeType="withEffect">
+                                <p:cTn id="37" presetID="2" presetClass="entr" presetSubtype="4" fill="hold" nodeType="withEffect">
                                   <p:stCondLst>
                                     <p:cond delay="0"/>
                                   </p:stCondLst>
                                   <p:childTnLst>
                                     <p:set>
                                       <p:cBhvr>
-                                        <p:cTn id="40" dur="1" fill="hold">
+                                        <p:cTn id="38" dur="1" fill="hold">
                                           <p:stCondLst>
                                             <p:cond delay="0"/>
                                           </p:stCondLst>
@@ -7669,7 +7498,7 @@
                                         <p:tgtEl>
                                           <p:spTgt spid="3075">
                                             <p:txEl>
-                                              <p:pRg st="7" end="7"/>
+                                              <p:pRg st="8" end="8"/>
                                             </p:txEl>
                                           </p:spTgt>
                                         </p:tgtEl>
@@ -7683,11 +7512,11 @@
                                     </p:set>
                                     <p:anim calcmode="lin" valueType="num">
                                       <p:cBhvr additive="base">
-                                        <p:cTn id="41" dur="500" fill="hold"/>
-                                        <p:tgtEl>
-                                          <p:spTgt spid="3075">
-                                            <p:txEl>
-                                              <p:pRg st="7" end="7"/>
+                                        <p:cTn id="39" dur="500" fill="hold"/>
+                                        <p:tgtEl>
+                                          <p:spTgt spid="3075">
+                                            <p:txEl>
+                                              <p:pRg st="8" end="8"/>
                                             </p:txEl>
                                           </p:spTgt>
                                         </p:tgtEl>
@@ -7710,11 +7539,11 @@
                                     </p:anim>
                                     <p:anim calcmode="lin" valueType="num">
                                       <p:cBhvr additive="base">
-                                        <p:cTn id="42" dur="500" fill="hold"/>
-                                        <p:tgtEl>
-                                          <p:spTgt spid="3075">
-                                            <p:txEl>
-                                              <p:pRg st="7" end="7"/>
+                                        <p:cTn id="40" dur="500" fill="hold"/>
+                                        <p:tgtEl>
+                                          <p:spTgt spid="3075">
+                                            <p:txEl>
+                                              <p:pRg st="8" end="8"/>
                                             </p:txEl>
                                           </p:spTgt>
                                         </p:tgtEl>
@@ -7739,14 +7568,14 @@
                                 </p:cTn>
                               </p:par>
                               <p:par>
-                                <p:cTn id="43" presetID="2" presetClass="entr" presetSubtype="4" fill="hold" nodeType="withEffect">
+                                <p:cTn id="41" presetID="2" presetClass="entr" presetSubtype="4" fill="hold" nodeType="withEffect">
                                   <p:stCondLst>
                                     <p:cond delay="0"/>
                                   </p:stCondLst>
                                   <p:childTnLst>
                                     <p:set>
                                       <p:cBhvr>
-                                        <p:cTn id="44" dur="1" fill="hold">
+                                        <p:cTn id="42" dur="1" fill="hold">
                                           <p:stCondLst>
                                             <p:cond delay="0"/>
                                           </p:stCondLst>
@@ -7754,7 +7583,7 @@
                                         <p:tgtEl>
                                           <p:spTgt spid="3075">
                                             <p:txEl>
-                                              <p:pRg st="8" end="8"/>
+                                              <p:pRg st="9" end="9"/>
                                             </p:txEl>
                                           </p:spTgt>
                                         </p:tgtEl>
@@ -7768,11 +7597,11 @@
                                     </p:set>
                                     <p:anim calcmode="lin" valueType="num">
                                       <p:cBhvr additive="base">
-                                        <p:cTn id="45" dur="500" fill="hold"/>
-                                        <p:tgtEl>
-                                          <p:spTgt spid="3075">
-                                            <p:txEl>
-                                              <p:pRg st="8" end="8"/>
+                                        <p:cTn id="43" dur="500" fill="hold"/>
+                                        <p:tgtEl>
+                                          <p:spTgt spid="3075">
+                                            <p:txEl>
+                                              <p:pRg st="9" end="9"/>
                                             </p:txEl>
                                           </p:spTgt>
                                         </p:tgtEl>
@@ -7795,11 +7624,11 @@
                                     </p:anim>
                                     <p:anim calcmode="lin" valueType="num">
                                       <p:cBhvr additive="base">
-                                        <p:cTn id="46" dur="500" fill="hold"/>
-                                        <p:tgtEl>
-                                          <p:spTgt spid="3075">
-                                            <p:txEl>
-                                              <p:pRg st="8" end="8"/>
+                                        <p:cTn id="44" dur="500" fill="hold"/>
+                                        <p:tgtEl>
+                                          <p:spTgt spid="3075">
+                                            <p:txEl>
+                                              <p:pRg st="9" end="9"/>
                                             </p:txEl>
                                           </p:spTgt>
                                         </p:tgtEl>
@@ -7824,14 +7653,14 @@
                                 </p:cTn>
                               </p:par>
                               <p:par>
-                                <p:cTn id="47" presetID="2" presetClass="entr" presetSubtype="4" fill="hold" nodeType="withEffect">
+                                <p:cTn id="45" presetID="2" presetClass="entr" presetSubtype="4" fill="hold" nodeType="withEffect">
                                   <p:stCondLst>
                                     <p:cond delay="0"/>
                                   </p:stCondLst>
                                   <p:childTnLst>
                                     <p:set>
                                       <p:cBhvr>
-                                        <p:cTn id="48" dur="1" fill="hold">
+                                        <p:cTn id="46" dur="1" fill="hold">
                                           <p:stCondLst>
                                             <p:cond delay="0"/>
                                           </p:stCondLst>
@@ -7839,7 +7668,7 @@
                                         <p:tgtEl>
                                           <p:spTgt spid="3075">
                                             <p:txEl>
-                                              <p:pRg st="9" end="9"/>
+                                              <p:pRg st="11" end="11"/>
                                             </p:txEl>
                                           </p:spTgt>
                                         </p:tgtEl>
@@ -7853,11 +7682,11 @@
                                     </p:set>
                                     <p:anim calcmode="lin" valueType="num">
                                       <p:cBhvr additive="base">
-                                        <p:cTn id="49" dur="500" fill="hold"/>
-                                        <p:tgtEl>
-                                          <p:spTgt spid="3075">
-                                            <p:txEl>
-                                              <p:pRg st="9" end="9"/>
+                                        <p:cTn id="47" dur="500" fill="hold"/>
+                                        <p:tgtEl>
+                                          <p:spTgt spid="3075">
+                                            <p:txEl>
+                                              <p:pRg st="11" end="11"/>
                                             </p:txEl>
                                           </p:spTgt>
                                         </p:tgtEl>
@@ -7880,199 +7709,11 @@
                                     </p:anim>
                                     <p:anim calcmode="lin" valueType="num">
                                       <p:cBhvr additive="base">
-                                        <p:cTn id="50" dur="500" fill="hold"/>
-                                        <p:tgtEl>
-                                          <p:spTgt spid="3075">
-                                            <p:txEl>
-                                              <p:pRg st="9" end="9"/>
-                                            </p:txEl>
-                                          </p:spTgt>
-                                        </p:tgtEl>
-                                        <p:attrNameLst>
-                                          <p:attrName>ppt_y</p:attrName>
-                                        </p:attrNameLst>
-                                      </p:cBhvr>
-                                      <p:tavLst>
-                                        <p:tav tm="0">
-                                          <p:val>
-                                            <p:strVal val="1+#ppt_h/2"/>
-                                          </p:val>
-                                        </p:tav>
-                                        <p:tav tm="100000">
-                                          <p:val>
-                                            <p:strVal val="#ppt_y"/>
-                                          </p:val>
-                                        </p:tav>
-                                      </p:tavLst>
-                                    </p:anim>
-                                  </p:childTnLst>
-                                </p:cTn>
-                              </p:par>
-                            </p:childTnLst>
-                          </p:cTn>
-                        </p:par>
-                      </p:childTnLst>
-                    </p:cTn>
-                  </p:par>
-                  <p:par>
-                    <p:cTn id="51" fill="hold">
-                      <p:stCondLst>
-                        <p:cond delay="indefinite"/>
-                      </p:stCondLst>
-                      <p:childTnLst>
-                        <p:par>
-                          <p:cTn id="52" fill="hold">
-                            <p:stCondLst>
-                              <p:cond delay="0"/>
-                            </p:stCondLst>
-                            <p:childTnLst>
-                              <p:par>
-                                <p:cTn id="53" presetID="2" presetClass="entr" presetSubtype="4" fill="hold" nodeType="clickEffect">
-                                  <p:stCondLst>
-                                    <p:cond delay="0"/>
-                                  </p:stCondLst>
-                                  <p:childTnLst>
-                                    <p:set>
-                                      <p:cBhvr>
-                                        <p:cTn id="54" dur="1" fill="hold">
-                                          <p:stCondLst>
-                                            <p:cond delay="0"/>
-                                          </p:stCondLst>
-                                        </p:cTn>
+                                        <p:cTn id="48" dur="500" fill="hold"/>
                                         <p:tgtEl>
                                           <p:spTgt spid="3075">
                                             <p:txEl>
                                               <p:pRg st="11" end="11"/>
-                                            </p:txEl>
-                                          </p:spTgt>
-                                        </p:tgtEl>
-                                        <p:attrNameLst>
-                                          <p:attrName>style.visibility</p:attrName>
-                                        </p:attrNameLst>
-                                      </p:cBhvr>
-                                      <p:to>
-                                        <p:strVal val="visible"/>
-                                      </p:to>
-                                    </p:set>
-                                    <p:anim calcmode="lin" valueType="num">
-                                      <p:cBhvr additive="base">
-                                        <p:cTn id="55" dur="500" fill="hold"/>
-                                        <p:tgtEl>
-                                          <p:spTgt spid="3075">
-                                            <p:txEl>
-                                              <p:pRg st="11" end="11"/>
-                                            </p:txEl>
-                                          </p:spTgt>
-                                        </p:tgtEl>
-                                        <p:attrNameLst>
-                                          <p:attrName>ppt_x</p:attrName>
-                                        </p:attrNameLst>
-                                      </p:cBhvr>
-                                      <p:tavLst>
-                                        <p:tav tm="0">
-                                          <p:val>
-                                            <p:strVal val="#ppt_x"/>
-                                          </p:val>
-                                        </p:tav>
-                                        <p:tav tm="100000">
-                                          <p:val>
-                                            <p:strVal val="#ppt_x"/>
-                                          </p:val>
-                                        </p:tav>
-                                      </p:tavLst>
-                                    </p:anim>
-                                    <p:anim calcmode="lin" valueType="num">
-                                      <p:cBhvr additive="base">
-                                        <p:cTn id="56" dur="500" fill="hold"/>
-                                        <p:tgtEl>
-                                          <p:spTgt spid="3075">
-                                            <p:txEl>
-                                              <p:pRg st="11" end="11"/>
-                                            </p:txEl>
-                                          </p:spTgt>
-                                        </p:tgtEl>
-                                        <p:attrNameLst>
-                                          <p:attrName>ppt_y</p:attrName>
-                                        </p:attrNameLst>
-                                      </p:cBhvr>
-                                      <p:tavLst>
-                                        <p:tav tm="0">
-                                          <p:val>
-                                            <p:strVal val="1+#ppt_h/2"/>
-                                          </p:val>
-                                        </p:tav>
-                                        <p:tav tm="100000">
-                                          <p:val>
-                                            <p:strVal val="#ppt_y"/>
-                                          </p:val>
-                                        </p:tav>
-                                      </p:tavLst>
-                                    </p:anim>
-                                  </p:childTnLst>
-                                </p:cTn>
-                              </p:par>
-                              <p:par>
-                                <p:cTn id="57" presetID="2" presetClass="entr" presetSubtype="4" fill="hold" nodeType="withEffect">
-                                  <p:stCondLst>
-                                    <p:cond delay="0"/>
-                                  </p:stCondLst>
-                                  <p:childTnLst>
-                                    <p:set>
-                                      <p:cBhvr>
-                                        <p:cTn id="58" dur="1" fill="hold">
-                                          <p:stCondLst>
-                                            <p:cond delay="0"/>
-                                          </p:stCondLst>
-                                        </p:cTn>
-                                        <p:tgtEl>
-                                          <p:spTgt spid="3075">
-                                            <p:txEl>
-                                              <p:pRg st="12" end="12"/>
-                                            </p:txEl>
-                                          </p:spTgt>
-                                        </p:tgtEl>
-                                        <p:attrNameLst>
-                                          <p:attrName>style.visibility</p:attrName>
-                                        </p:attrNameLst>
-                                      </p:cBhvr>
-                                      <p:to>
-                                        <p:strVal val="visible"/>
-                                      </p:to>
-                                    </p:set>
-                                    <p:anim calcmode="lin" valueType="num">
-                                      <p:cBhvr additive="base">
-                                        <p:cTn id="59" dur="500" fill="hold"/>
-                                        <p:tgtEl>
-                                          <p:spTgt spid="3075">
-                                            <p:txEl>
-                                              <p:pRg st="12" end="12"/>
-                                            </p:txEl>
-                                          </p:spTgt>
-                                        </p:tgtEl>
-                                        <p:attrNameLst>
-                                          <p:attrName>ppt_x</p:attrName>
-                                        </p:attrNameLst>
-                                      </p:cBhvr>
-                                      <p:tavLst>
-                                        <p:tav tm="0">
-                                          <p:val>
-                                            <p:strVal val="#ppt_x"/>
-                                          </p:val>
-                                        </p:tav>
-                                        <p:tav tm="100000">
-                                          <p:val>
-                                            <p:strVal val="#ppt_x"/>
-                                          </p:val>
-                                        </p:tav>
-                                      </p:tavLst>
-                                    </p:anim>
-                                    <p:anim calcmode="lin" valueType="num">
-                                      <p:cBhvr additive="base">
-                                        <p:cTn id="60" dur="500" fill="hold"/>
-                                        <p:tgtEl>
-                                          <p:spTgt spid="3075">
-                                            <p:txEl>
-                                              <p:pRg st="12" end="12"/>
                                             </p:txEl>
                                           </p:spTgt>
                                         </p:tgtEl>
@@ -12552,298 +12193,6 @@
           <a:lstStyle/>
           <a:p>
             <a:endParaRPr lang="en-US"/>
-          </a:p>
-        </p:txBody>
-      </p:sp>
-      <p:pic>
-        <p:nvPicPr>
-          <p:cNvPr id="5130" name="Picture 10" descr="MAT logo vertical_red.emf"/>
-          <p:cNvPicPr>
-            <a:picLocks noChangeAspect="1"/>
-          </p:cNvPicPr>
-          <p:nvPr/>
-        </p:nvPicPr>
-        <p:blipFill>
-          <a:blip r:embed="rId2"/>
-          <a:srcRect/>
-          <a:stretch>
-            <a:fillRect/>
-          </a:stretch>
-        </p:blipFill>
-        <p:spPr bwMode="auto">
-          <a:xfrm>
-            <a:off x="6400800" y="5181600"/>
-            <a:ext cx="2286000" cy="1119188"/>
-          </a:xfrm>
-          <a:prstGeom prst="rect">
-            <a:avLst/>
-          </a:prstGeom>
-          <a:noFill/>
-          <a:ln w="9525">
-            <a:noFill/>
-            <a:miter lim="800000"/>
-            <a:headEnd/>
-            <a:tailEnd/>
-          </a:ln>
-        </p:spPr>
-      </p:pic>
-      <p:sp>
-        <p:nvSpPr>
-          <p:cNvPr id="15" name="Rectangle 9"/>
-          <p:cNvSpPr txBox="1">
-            <a:spLocks noChangeArrowheads="1"/>
-          </p:cNvSpPr>
-          <p:nvPr/>
-        </p:nvSpPr>
-        <p:spPr bwMode="auto">
-          <a:xfrm>
-            <a:off x="228600" y="4876800"/>
-            <a:ext cx="6172200" cy="1828800"/>
-          </a:xfrm>
-          <a:prstGeom prst="rect">
-            <a:avLst/>
-          </a:prstGeom>
-          <a:noFill/>
-          <a:ln w="9525">
-            <a:noFill/>
-            <a:miter lim="800000"/>
-            <a:headEnd/>
-            <a:tailEnd/>
-          </a:ln>
-        </p:spPr>
-        <p:txBody>
-          <a:bodyPr vert="horz" wrap="square" lIns="91440" tIns="45720" rIns="91440" bIns="45720" numCol="1" anchor="t" anchorCtr="0" compatLnSpc="1">
-            <a:prstTxWarp prst="textNoShape">
-              <a:avLst/>
-            </a:prstTxWarp>
-          </a:bodyPr>
-          <a:lstStyle/>
-          <a:p>
-            <a:pPr marL="342900" marR="0" lvl="0" indent="-342900" algn="l" defTabSz="914400" rtl="0" eaLnBrk="1" fontAlgn="base" latinLnBrk="0" hangingPunct="1">
-              <a:lnSpc>
-                <a:spcPct val="80000"/>
-              </a:lnSpc>
-              <a:spcBef>
-                <a:spcPct val="20000"/>
-              </a:spcBef>
-              <a:spcAft>
-                <a:spcPct val="0"/>
-              </a:spcAft>
-              <a:buClrTx/>
-              <a:buSzTx/>
-              <a:buFont typeface="Arial" charset="0"/>
-              <a:buNone/>
-              <a:tabLst/>
-              <a:defRPr/>
-            </a:pPr>
-            <a:r>
-              <a:rPr kumimoji="0" lang="en-US" sz="2000" b="0" i="0" u="none" strike="noStrike" kern="1200" cap="none" spc="0" normalizeH="0" baseline="0" noProof="0" smtClean="0">
-                <a:ln>
-                  <a:noFill/>
-                </a:ln>
-                <a:solidFill>
-                  <a:schemeClr val="bg1"/>
-                </a:solidFill>
-                <a:effectLst/>
-                <a:uLnTx/>
-                <a:uFillTx/>
-                <a:latin typeface="+mn-lt"/>
-                <a:ea typeface="+mn-ea"/>
-                <a:cs typeface="+mn-cs"/>
-              </a:rPr>
-              <a:t>www.mclaneat.com</a:t>
-            </a:r>
-          </a:p>
-          <a:p>
-            <a:pPr marL="342900" marR="0" lvl="0" indent="-342900" algn="l" defTabSz="914400" rtl="0" eaLnBrk="1" fontAlgn="base" latinLnBrk="0" hangingPunct="1">
-              <a:lnSpc>
-                <a:spcPct val="80000"/>
-              </a:lnSpc>
-              <a:spcBef>
-                <a:spcPct val="20000"/>
-              </a:spcBef>
-              <a:spcAft>
-                <a:spcPct val="0"/>
-              </a:spcAft>
-              <a:buClrTx/>
-              <a:buSzTx/>
-              <a:buFont typeface="Arial" charset="0"/>
-              <a:buNone/>
-              <a:tabLst/>
-              <a:defRPr/>
-            </a:pPr>
-            <a:endParaRPr kumimoji="0" lang="en-US" sz="2000" b="0" i="0" u="none" strike="noStrike" kern="1200" cap="none" spc="0" normalizeH="0" baseline="0" noProof="0" smtClean="0">
-              <a:ln>
-                <a:noFill/>
-              </a:ln>
-              <a:solidFill>
-                <a:schemeClr val="bg1"/>
-              </a:solidFill>
-              <a:effectLst/>
-              <a:uLnTx/>
-              <a:uFillTx/>
-              <a:latin typeface="+mn-lt"/>
-              <a:ea typeface="+mn-ea"/>
-              <a:cs typeface="+mn-cs"/>
-            </a:endParaRPr>
-          </a:p>
-          <a:p>
-            <a:pPr marL="342900" marR="0" lvl="0" indent="-342900" algn="l" defTabSz="914400" rtl="0" eaLnBrk="1" fontAlgn="base" latinLnBrk="0" hangingPunct="1">
-              <a:lnSpc>
-                <a:spcPct val="80000"/>
-              </a:lnSpc>
-              <a:spcBef>
-                <a:spcPct val="20000"/>
-              </a:spcBef>
-              <a:spcAft>
-                <a:spcPct val="0"/>
-              </a:spcAft>
-              <a:buClrTx/>
-              <a:buSzTx/>
-              <a:buFont typeface="Arial" charset="0"/>
-              <a:buNone/>
-              <a:tabLst/>
-              <a:defRPr/>
-            </a:pPr>
-            <a:r>
-              <a:rPr kumimoji="0" lang="en-US" sz="2000" b="0" i="0" u="none" strike="noStrike" kern="1200" cap="none" spc="0" normalizeH="0" baseline="0" noProof="0" smtClean="0">
-                <a:ln>
-                  <a:noFill/>
-                </a:ln>
-                <a:solidFill>
-                  <a:schemeClr val="bg1"/>
-                </a:solidFill>
-                <a:effectLst/>
-                <a:uLnTx/>
-                <a:uFillTx/>
-                <a:latin typeface="+mn-lt"/>
-                <a:ea typeface="+mn-ea"/>
-                <a:cs typeface="+mn-cs"/>
-              </a:rPr>
-              <a:t>McLane Advanced Technologies</a:t>
-            </a:r>
-          </a:p>
-          <a:p>
-            <a:pPr marL="342900" marR="0" lvl="0" indent="-342900" algn="l" defTabSz="914400" rtl="0" eaLnBrk="1" fontAlgn="base" latinLnBrk="0" hangingPunct="1">
-              <a:lnSpc>
-                <a:spcPct val="80000"/>
-              </a:lnSpc>
-              <a:spcBef>
-                <a:spcPct val="20000"/>
-              </a:spcBef>
-              <a:spcAft>
-                <a:spcPct val="0"/>
-              </a:spcAft>
-              <a:buClrTx/>
-              <a:buSzTx/>
-              <a:buFont typeface="Arial" charset="0"/>
-              <a:buNone/>
-              <a:tabLst/>
-              <a:defRPr/>
-            </a:pPr>
-            <a:r>
-              <a:rPr kumimoji="0" lang="en-US" sz="2000" b="0" i="0" u="none" strike="noStrike" kern="1200" cap="none" spc="0" normalizeH="0" baseline="0" noProof="0" smtClean="0">
-                <a:ln>
-                  <a:noFill/>
-                </a:ln>
-                <a:solidFill>
-                  <a:schemeClr val="bg1"/>
-                </a:solidFill>
-                <a:effectLst/>
-                <a:uLnTx/>
-                <a:uFillTx/>
-                <a:latin typeface="+mn-lt"/>
-                <a:ea typeface="+mn-ea"/>
-                <a:cs typeface="+mn-cs"/>
-              </a:rPr>
-              <a:t>4001 Central Pointe Parkway</a:t>
-            </a:r>
-          </a:p>
-          <a:p>
-            <a:pPr marL="342900" marR="0" lvl="0" indent="-342900" algn="l" defTabSz="914400" rtl="0" eaLnBrk="1" fontAlgn="base" latinLnBrk="0" hangingPunct="1">
-              <a:lnSpc>
-                <a:spcPct val="80000"/>
-              </a:lnSpc>
-              <a:spcBef>
-                <a:spcPct val="20000"/>
-              </a:spcBef>
-              <a:spcAft>
-                <a:spcPct val="0"/>
-              </a:spcAft>
-              <a:buClrTx/>
-              <a:buSzTx/>
-              <a:buFont typeface="Arial" charset="0"/>
-              <a:buNone/>
-              <a:tabLst/>
-              <a:defRPr/>
-            </a:pPr>
-            <a:r>
-              <a:rPr kumimoji="0" lang="en-US" sz="2000" b="0" i="0" u="none" strike="noStrike" kern="1200" cap="none" spc="0" normalizeH="0" baseline="0" noProof="0" smtClean="0">
-                <a:ln>
-                  <a:noFill/>
-                </a:ln>
-                <a:solidFill>
-                  <a:schemeClr val="bg1"/>
-                </a:solidFill>
-                <a:effectLst/>
-                <a:uLnTx/>
-                <a:uFillTx/>
-                <a:latin typeface="+mn-lt"/>
-                <a:ea typeface="+mn-ea"/>
-                <a:cs typeface="+mn-cs"/>
-              </a:rPr>
-              <a:t>Temple, Texas 76504</a:t>
-            </a:r>
-          </a:p>
-          <a:p>
-            <a:pPr marL="342900" marR="0" lvl="0" indent="-342900" algn="l" defTabSz="914400" rtl="0" eaLnBrk="1" fontAlgn="base" latinLnBrk="0" hangingPunct="1">
-              <a:lnSpc>
-                <a:spcPct val="80000"/>
-              </a:lnSpc>
-              <a:spcBef>
-                <a:spcPct val="20000"/>
-              </a:spcBef>
-              <a:spcAft>
-                <a:spcPct val="0"/>
-              </a:spcAft>
-              <a:buClrTx/>
-              <a:buSzTx/>
-              <a:buFont typeface="Wingdings" pitchFamily="2" charset="2"/>
-              <a:buNone/>
-              <a:tabLst/>
-              <a:defRPr/>
-            </a:pPr>
-            <a:r>
-              <a:rPr kumimoji="0" lang="en-US" sz="2000" b="0" i="0" u="none" strike="noStrike" kern="1200" cap="none" spc="0" normalizeH="0" baseline="0" noProof="0" smtClean="0">
-                <a:ln>
-                  <a:noFill/>
-                </a:ln>
-                <a:solidFill>
-                  <a:schemeClr val="bg1"/>
-                </a:solidFill>
-                <a:effectLst/>
-                <a:uLnTx/>
-                <a:uFillTx/>
-                <a:latin typeface="+mn-lt"/>
-                <a:ea typeface="+mn-ea"/>
-                <a:cs typeface="+mn-cs"/>
-              </a:rPr>
-              <a:t>800-988-5428</a:t>
-            </a:r>
-            <a:endParaRPr kumimoji="0" lang="en-US" sz="2000" b="0" i="0" u="none" strike="noStrike" kern="1200" cap="none" spc="0" normalizeH="0" baseline="0" noProof="0" dirty="0" smtClean="0">
-              <a:ln>
-                <a:noFill/>
-              </a:ln>
-              <a:solidFill>
-                <a:schemeClr val="bg1"/>
-              </a:solidFill>
-              <a:effectLst/>
-              <a:uLnTx/>
-              <a:uFillTx/>
-              <a:latin typeface="+mn-lt"/>
-              <a:ea typeface="+mn-ea"/>
-              <a:cs typeface="+mn-cs"/>
-            </a:endParaRPr>
           </a:p>
         </p:txBody>
       </p:sp>
@@ -25786,21 +25135,6 @@
 </file>
 
 <file path=customXml/item1.xml><?xml version="1.0" encoding="utf-8"?>
-<?mso-contentType ?>
-<FormTemplates xmlns="http://schemas.microsoft.com/sharepoint/v3/contenttype/forms">
-  <Display>DocumentLibraryForm</Display>
-  <Edit>DocumentLibraryForm</Edit>
-  <New>DocumentLibraryForm</New>
-</FormTemplates>
-</file>
-
-<file path=customXml/item2.xml><?xml version="1.0" encoding="utf-8"?>
-<p:properties xmlns:p="http://schemas.microsoft.com/office/2006/metadata/properties" xmlns:xsi="http://www.w3.org/2001/XMLSchema-instance">
-  <documentManagement/>
-</p:properties>
-</file>
-
-<file path=customXml/item3.xml><?xml version="1.0" encoding="utf-8"?>
 <ct:contentTypeSchema xmlns:ct="http://schemas.microsoft.com/office/2006/metadata/contentType" xmlns:ma="http://schemas.microsoft.com/office/2006/metadata/properties/metaAttributes" ct:_="" ma:_="" ma:contentTypeName="Document" ma:contentTypeID="0x010100081EEA846D466D42A2F8C262663B0874" ma:contentTypeVersion="0" ma:contentTypeDescription="Create a new document." ma:contentTypeScope="" ma:versionID="bb71263b1de598fc4454cb39f55dc523">
   <xsd:schema xmlns:xsd="http://www.w3.org/2001/XMLSchema" xmlns:p="http://schemas.microsoft.com/office/2006/metadata/properties" targetNamespace="http://schemas.microsoft.com/office/2006/metadata/properties" ma:root="true" ma:fieldsID="4aeb20c0e3442673af7ee10786458764">
     <xsd:element name="properties">
@@ -25849,10 +25183,32 @@
 </ct:contentTypeSchema>
 </file>
 
+<file path=customXml/item2.xml><?xml version="1.0" encoding="utf-8"?>
+<p:properties xmlns:p="http://schemas.microsoft.com/office/2006/metadata/properties" xmlns:xsi="http://www.w3.org/2001/XMLSchema-instance">
+  <documentManagement/>
+</p:properties>
+</file>
+
+<file path=customXml/item3.xml><?xml version="1.0" encoding="utf-8"?>
+<?mso-contentType ?>
+<FormTemplates xmlns="http://schemas.microsoft.com/sharepoint/v3/contenttype/forms">
+  <Display>DocumentLibraryForm</Display>
+  <Edit>DocumentLibraryForm</Edit>
+  <New>DocumentLibraryForm</New>
+</FormTemplates>
+</file>
+
 <file path=customXml/itemProps1.xml><?xml version="1.0" encoding="utf-8"?>
-<ds:datastoreItem xmlns:ds="http://schemas.openxmlformats.org/officeDocument/2006/customXml" ds:itemID="{B8CDF88D-34F6-4273-95F6-DA3DE3684139}">
+<ds:datastoreItem xmlns:ds="http://schemas.openxmlformats.org/officeDocument/2006/customXml" ds:itemID="{ADBD3571-0B2C-4EE2-BC06-1BEB32539D86}">
   <ds:schemaRefs>
-    <ds:schemaRef ds:uri="http://schemas.microsoft.com/sharepoint/v3/contenttype/forms"/>
+    <ds:schemaRef ds:uri="http://schemas.microsoft.com/office/2006/metadata/contentType"/>
+    <ds:schemaRef ds:uri="http://schemas.microsoft.com/office/2006/metadata/properties/metaAttributes"/>
+    <ds:schemaRef ds:uri="http://www.w3.org/2001/XMLSchema"/>
+    <ds:schemaRef ds:uri="http://schemas.microsoft.com/office/2006/metadata/properties"/>
+    <ds:schemaRef ds:uri="http://schemas.openxmlformats.org/package/2006/metadata/core-properties"/>
+    <ds:schemaRef ds:uri="http://purl.org/dc/elements/1.1/"/>
+    <ds:schemaRef ds:uri="http://purl.org/dc/terms/"/>
+    <ds:schemaRef ds:uri="http://schemas.microsoft.com/office/internal/2005/internalDocumentation"/>
   </ds:schemaRefs>
 </ds:datastoreItem>
 </file>
@@ -25872,16 +25228,9 @@
 </file>
 
 <file path=customXml/itemProps3.xml><?xml version="1.0" encoding="utf-8"?>
-<ds:datastoreItem xmlns:ds="http://schemas.openxmlformats.org/officeDocument/2006/customXml" ds:itemID="{ADBD3571-0B2C-4EE2-BC06-1BEB32539D86}">
+<ds:datastoreItem xmlns:ds="http://schemas.openxmlformats.org/officeDocument/2006/customXml" ds:itemID="{B8CDF88D-34F6-4273-95F6-DA3DE3684139}">
   <ds:schemaRefs>
-    <ds:schemaRef ds:uri="http://schemas.microsoft.com/office/2006/metadata/contentType"/>
-    <ds:schemaRef ds:uri="http://schemas.microsoft.com/office/2006/metadata/properties/metaAttributes"/>
-    <ds:schemaRef ds:uri="http://www.w3.org/2001/XMLSchema"/>
-    <ds:schemaRef ds:uri="http://schemas.microsoft.com/office/2006/metadata/properties"/>
-    <ds:schemaRef ds:uri="http://schemas.openxmlformats.org/package/2006/metadata/core-properties"/>
-    <ds:schemaRef ds:uri="http://purl.org/dc/elements/1.1/"/>
-    <ds:schemaRef ds:uri="http://purl.org/dc/terms/"/>
-    <ds:schemaRef ds:uri="http://schemas.microsoft.com/office/internal/2005/internalDocumentation"/>
+    <ds:schemaRef ds:uri="http://schemas.microsoft.com/sharepoint/v3/contenttype/forms"/>
   </ds:schemaRefs>
 </ds:datastoreItem>
 </file>
</xml_diff>